<commit_message>
Added the Feature Table slide and corrected a typo
</commit_message>
<xml_diff>
--- a/Dried Beans Multiclassifiers.pptx
+++ b/Dried Beans Multiclassifiers.pptx
@@ -8,17 +8,18 @@
     <p:sldId id="256" r:id="rId2"/>
     <p:sldId id="257" r:id="rId3"/>
     <p:sldId id="258" r:id="rId4"/>
-    <p:sldId id="261" r:id="rId5"/>
-    <p:sldId id="259" r:id="rId6"/>
-    <p:sldId id="260" r:id="rId7"/>
-    <p:sldId id="262" r:id="rId8"/>
-    <p:sldId id="264" r:id="rId9"/>
-    <p:sldId id="263" r:id="rId10"/>
-    <p:sldId id="265" r:id="rId11"/>
-    <p:sldId id="266" r:id="rId12"/>
-    <p:sldId id="267" r:id="rId13"/>
-    <p:sldId id="268" r:id="rId14"/>
-    <p:sldId id="269" r:id="rId15"/>
+    <p:sldId id="270" r:id="rId5"/>
+    <p:sldId id="261" r:id="rId6"/>
+    <p:sldId id="259" r:id="rId7"/>
+    <p:sldId id="260" r:id="rId8"/>
+    <p:sldId id="262" r:id="rId9"/>
+    <p:sldId id="264" r:id="rId10"/>
+    <p:sldId id="263" r:id="rId11"/>
+    <p:sldId id="265" r:id="rId12"/>
+    <p:sldId id="266" r:id="rId13"/>
+    <p:sldId id="267" r:id="rId14"/>
+    <p:sldId id="268" r:id="rId15"/>
+    <p:sldId id="269" r:id="rId16"/>
   </p:sldIdLst>
   <p:sldSz cx="12192000" cy="6858000"/>
   <p:notesSz cx="6858000" cy="9144000"/>
@@ -7813,6 +7814,92 @@
           <p:cNvPr id="2" name="Title 1">
             <a:extLst>
               <a:ext uri="{FF2B5EF4-FFF2-40B4-BE49-F238E27FC236}">
+                <a16:creationId xmlns:a16="http://schemas.microsoft.com/office/drawing/2014/main" id="{3310FC7E-C825-F0BD-A1DD-385964BABEAB}"/>
+              </a:ext>
+            </a:extLst>
+          </p:cNvPr>
+          <p:cNvSpPr>
+            <a:spLocks noGrp="1"/>
+          </p:cNvSpPr>
+          <p:nvPr>
+            <p:ph type="title"/>
+          </p:nvPr>
+        </p:nvSpPr>
+        <p:spPr/>
+        <p:txBody>
+          <a:bodyPr/>
+          <a:lstStyle/>
+          <a:p>
+            <a:r>
+              <a:rPr lang="en-US" dirty="0"/>
+              <a:t>Building a model 2</a:t>
+            </a:r>
+          </a:p>
+        </p:txBody>
+      </p:sp>
+      <p:sp>
+        <p:nvSpPr>
+          <p:cNvPr id="3" name="Text Placeholder 2">
+            <a:extLst>
+              <a:ext uri="{FF2B5EF4-FFF2-40B4-BE49-F238E27FC236}">
+                <a16:creationId xmlns:a16="http://schemas.microsoft.com/office/drawing/2014/main" id="{1074075D-CE01-638E-DE5A-4C66625E0881}"/>
+              </a:ext>
+            </a:extLst>
+          </p:cNvPr>
+          <p:cNvSpPr>
+            <a:spLocks noGrp="1"/>
+          </p:cNvSpPr>
+          <p:nvPr>
+            <p:ph type="body" idx="1"/>
+          </p:nvPr>
+        </p:nvSpPr>
+        <p:spPr/>
+        <p:txBody>
+          <a:bodyPr/>
+          <a:lstStyle/>
+          <a:p>
+            <a:r>
+              <a:rPr lang="en-US" dirty="0"/>
+              <a:t>Random Forest</a:t>
+            </a:r>
+          </a:p>
+        </p:txBody>
+      </p:sp>
+    </p:spTree>
+    <p:extLst>
+      <p:ext uri="{BB962C8B-B14F-4D97-AF65-F5344CB8AC3E}">
+        <p14:creationId xmlns:p14="http://schemas.microsoft.com/office/powerpoint/2010/main" val="3275172996"/>
+      </p:ext>
+    </p:extLst>
+  </p:cSld>
+  <p:clrMapOvr>
+    <a:masterClrMapping/>
+  </p:clrMapOvr>
+</p:sld>
+</file>
+
+<file path=ppt/slides/slide11.xml><?xml version="1.0" encoding="utf-8"?>
+<p:sld xmlns:a="http://schemas.openxmlformats.org/drawingml/2006/main" xmlns:r="http://schemas.openxmlformats.org/officeDocument/2006/relationships" xmlns:p="http://schemas.openxmlformats.org/presentationml/2006/main">
+  <p:cSld>
+    <p:spTree>
+      <p:nvGrpSpPr>
+        <p:cNvPr id="1" name=""/>
+        <p:cNvGrpSpPr/>
+        <p:nvPr/>
+      </p:nvGrpSpPr>
+      <p:grpSpPr>
+        <a:xfrm>
+          <a:off x="0" y="0"/>
+          <a:ext cx="0" cy="0"/>
+          <a:chOff x="0" y="0"/>
+          <a:chExt cx="0" cy="0"/>
+        </a:xfrm>
+      </p:grpSpPr>
+      <p:sp>
+        <p:nvSpPr>
+          <p:cNvPr id="2" name="Title 1">
+            <a:extLst>
+              <a:ext uri="{FF2B5EF4-FFF2-40B4-BE49-F238E27FC236}">
                 <a16:creationId xmlns:a16="http://schemas.microsoft.com/office/drawing/2014/main" id="{44B171F1-93B1-E1DA-B1D6-9A96914CE052}"/>
               </a:ext>
             </a:extLst>
@@ -7885,7 +7972,7 @@
 </p:sld>
 </file>
 
-<file path=ppt/slides/slide11.xml><?xml version="1.0" encoding="utf-8"?>
+<file path=ppt/slides/slide12.xml><?xml version="1.0" encoding="utf-8"?>
 <p:sld xmlns:a="http://schemas.openxmlformats.org/drawingml/2006/main" xmlns:r="http://schemas.openxmlformats.org/officeDocument/2006/relationships" xmlns:p="http://schemas.openxmlformats.org/presentationml/2006/main">
   <p:cSld>
     <p:spTree>
@@ -8036,7 +8123,7 @@
 </p:sld>
 </file>
 
-<file path=ppt/slides/slide12.xml><?xml version="1.0" encoding="utf-8"?>
+<file path=ppt/slides/slide13.xml><?xml version="1.0" encoding="utf-8"?>
 <p:sld xmlns:a="http://schemas.openxmlformats.org/drawingml/2006/main" xmlns:r="http://schemas.openxmlformats.org/officeDocument/2006/relationships" xmlns:p="http://schemas.openxmlformats.org/presentationml/2006/main">
   <p:cSld>
     <p:spTree>
@@ -8144,112 +8231,6 @@
 </p:sld>
 </file>
 
-<file path=ppt/slides/slide13.xml><?xml version="1.0" encoding="utf-8"?>
-<p:sld xmlns:a="http://schemas.openxmlformats.org/drawingml/2006/main" xmlns:r="http://schemas.openxmlformats.org/officeDocument/2006/relationships" xmlns:p="http://schemas.openxmlformats.org/presentationml/2006/main">
-  <p:cSld>
-    <p:spTree>
-      <p:nvGrpSpPr>
-        <p:cNvPr id="1" name=""/>
-        <p:cNvGrpSpPr/>
-        <p:nvPr/>
-      </p:nvGrpSpPr>
-      <p:grpSpPr>
-        <a:xfrm>
-          <a:off x="0" y="0"/>
-          <a:ext cx="0" cy="0"/>
-          <a:chOff x="0" y="0"/>
-          <a:chExt cx="0" cy="0"/>
-        </a:xfrm>
-      </p:grpSpPr>
-      <p:sp>
-        <p:nvSpPr>
-          <p:cNvPr id="2" name="Title 1">
-            <a:extLst>
-              <a:ext uri="{FF2B5EF4-FFF2-40B4-BE49-F238E27FC236}">
-                <a16:creationId xmlns:a16="http://schemas.microsoft.com/office/drawing/2014/main" id="{F456D3CB-4182-D6AE-D828-EC569339C209}"/>
-              </a:ext>
-            </a:extLst>
-          </p:cNvPr>
-          <p:cNvSpPr>
-            <a:spLocks noGrp="1"/>
-          </p:cNvSpPr>
-          <p:nvPr>
-            <p:ph type="title"/>
-          </p:nvPr>
-        </p:nvSpPr>
-        <p:spPr/>
-        <p:txBody>
-          <a:bodyPr/>
-          <a:lstStyle/>
-          <a:p>
-            <a:r>
-              <a:rPr lang="en-US" dirty="0"/>
-              <a:t>Conclusions</a:t>
-            </a:r>
-          </a:p>
-        </p:txBody>
-      </p:sp>
-      <p:sp>
-        <p:nvSpPr>
-          <p:cNvPr id="3" name="Content Placeholder 2">
-            <a:extLst>
-              <a:ext uri="{FF2B5EF4-FFF2-40B4-BE49-F238E27FC236}">
-                <a16:creationId xmlns:a16="http://schemas.microsoft.com/office/drawing/2014/main" id="{400887C0-8BE7-936F-FA20-E756657AD65C}"/>
-              </a:ext>
-            </a:extLst>
-          </p:cNvPr>
-          <p:cNvSpPr>
-            <a:spLocks noGrp="1"/>
-          </p:cNvSpPr>
-          <p:nvPr>
-            <p:ph idx="1"/>
-          </p:nvPr>
-        </p:nvSpPr>
-        <p:spPr/>
-        <p:txBody>
-          <a:bodyPr/>
-          <a:lstStyle/>
-          <a:p>
-            <a:r>
-              <a:rPr lang="en-US" dirty="0"/>
-              <a:t>I thought that there looked like a lot of correlation between features from the heatmap, so I  thought that the random forest classifier, since it uses feature reduction, would do better than it did.</a:t>
-            </a:r>
-          </a:p>
-          <a:p>
-            <a:r>
-              <a:rPr lang="en-US" dirty="0"/>
-              <a:t>My two models performed consistently with the four models from the paper.</a:t>
-            </a:r>
-          </a:p>
-          <a:p>
-            <a:r>
-              <a:rPr lang="en-US" dirty="0"/>
-              <a:t>I used </a:t>
-            </a:r>
-            <a:r>
-              <a:rPr lang="en-US" dirty="0" err="1"/>
-              <a:t>test_train_split</a:t>
-            </a:r>
-            <a:r>
-              <a:rPr lang="en-US" dirty="0"/>
-              <a:t> rather than cross validation, so looking at their scores versus my scores are comparing apples to the specific apple variety that I had handy. I should have used cross validation as well.</a:t>
-            </a:r>
-          </a:p>
-        </p:txBody>
-      </p:sp>
-    </p:spTree>
-    <p:extLst>
-      <p:ext uri="{BB962C8B-B14F-4D97-AF65-F5344CB8AC3E}">
-        <p14:creationId xmlns:p14="http://schemas.microsoft.com/office/powerpoint/2010/main" val="1970175959"/>
-      </p:ext>
-    </p:extLst>
-  </p:cSld>
-  <p:clrMapOvr>
-    <a:masterClrMapping/>
-  </p:clrMapOvr>
-</p:sld>
-</file>
-
 <file path=ppt/slides/slide14.xml><?xml version="1.0" encoding="utf-8"?>
 <p:sld xmlns:a="http://schemas.openxmlformats.org/drawingml/2006/main" xmlns:r="http://schemas.openxmlformats.org/officeDocument/2006/relationships" xmlns:p="http://schemas.openxmlformats.org/presentationml/2006/main">
   <p:cSld>
@@ -8272,6 +8253,112 @@
           <p:cNvPr id="2" name="Title 1">
             <a:extLst>
               <a:ext uri="{FF2B5EF4-FFF2-40B4-BE49-F238E27FC236}">
+                <a16:creationId xmlns:a16="http://schemas.microsoft.com/office/drawing/2014/main" id="{F456D3CB-4182-D6AE-D828-EC569339C209}"/>
+              </a:ext>
+            </a:extLst>
+          </p:cNvPr>
+          <p:cNvSpPr>
+            <a:spLocks noGrp="1"/>
+          </p:cNvSpPr>
+          <p:nvPr>
+            <p:ph type="title"/>
+          </p:nvPr>
+        </p:nvSpPr>
+        <p:spPr/>
+        <p:txBody>
+          <a:bodyPr/>
+          <a:lstStyle/>
+          <a:p>
+            <a:r>
+              <a:rPr lang="en-US" dirty="0"/>
+              <a:t>Conclusions</a:t>
+            </a:r>
+          </a:p>
+        </p:txBody>
+      </p:sp>
+      <p:sp>
+        <p:nvSpPr>
+          <p:cNvPr id="3" name="Content Placeholder 2">
+            <a:extLst>
+              <a:ext uri="{FF2B5EF4-FFF2-40B4-BE49-F238E27FC236}">
+                <a16:creationId xmlns:a16="http://schemas.microsoft.com/office/drawing/2014/main" id="{400887C0-8BE7-936F-FA20-E756657AD65C}"/>
+              </a:ext>
+            </a:extLst>
+          </p:cNvPr>
+          <p:cNvSpPr>
+            <a:spLocks noGrp="1"/>
+          </p:cNvSpPr>
+          <p:nvPr>
+            <p:ph idx="1"/>
+          </p:nvPr>
+        </p:nvSpPr>
+        <p:spPr/>
+        <p:txBody>
+          <a:bodyPr/>
+          <a:lstStyle/>
+          <a:p>
+            <a:r>
+              <a:rPr lang="en-US" dirty="0"/>
+              <a:t>I thought that there looked like a lot of correlation between features from the heatmap, so I  thought that the random forest classifier, since it uses feature reduction, would do better than it did.</a:t>
+            </a:r>
+          </a:p>
+          <a:p>
+            <a:r>
+              <a:rPr lang="en-US" dirty="0"/>
+              <a:t>My two models performed consistently with the four models from the paper.</a:t>
+            </a:r>
+          </a:p>
+          <a:p>
+            <a:r>
+              <a:rPr lang="en-US" dirty="0"/>
+              <a:t>I used </a:t>
+            </a:r>
+            <a:r>
+              <a:rPr lang="en-US" dirty="0" err="1"/>
+              <a:t>test_train_split</a:t>
+            </a:r>
+            <a:r>
+              <a:rPr lang="en-US" dirty="0"/>
+              <a:t> rather than cross validation, so looking at their scores versus my scores are comparing apples to the specific apple variety that I had handy. I should have used cross validation as well.</a:t>
+            </a:r>
+          </a:p>
+        </p:txBody>
+      </p:sp>
+    </p:spTree>
+    <p:extLst>
+      <p:ext uri="{BB962C8B-B14F-4D97-AF65-F5344CB8AC3E}">
+        <p14:creationId xmlns:p14="http://schemas.microsoft.com/office/powerpoint/2010/main" val="1970175959"/>
+      </p:ext>
+    </p:extLst>
+  </p:cSld>
+  <p:clrMapOvr>
+    <a:masterClrMapping/>
+  </p:clrMapOvr>
+</p:sld>
+</file>
+
+<file path=ppt/slides/slide15.xml><?xml version="1.0" encoding="utf-8"?>
+<p:sld xmlns:a="http://schemas.openxmlformats.org/drawingml/2006/main" xmlns:r="http://schemas.openxmlformats.org/officeDocument/2006/relationships" xmlns:p="http://schemas.openxmlformats.org/presentationml/2006/main">
+  <p:cSld>
+    <p:spTree>
+      <p:nvGrpSpPr>
+        <p:cNvPr id="1" name=""/>
+        <p:cNvGrpSpPr/>
+        <p:nvPr/>
+      </p:nvGrpSpPr>
+      <p:grpSpPr>
+        <a:xfrm>
+          <a:off x="0" y="0"/>
+          <a:ext cx="0" cy="0"/>
+          <a:chOff x="0" y="0"/>
+          <a:chExt cx="0" cy="0"/>
+        </a:xfrm>
+      </p:grpSpPr>
+      <p:sp>
+        <p:nvSpPr>
+          <p:cNvPr id="2" name="Title 1">
+            <a:extLst>
+              <a:ext uri="{FF2B5EF4-FFF2-40B4-BE49-F238E27FC236}">
                 <a16:creationId xmlns:a16="http://schemas.microsoft.com/office/drawing/2014/main" id="{291EDB23-29CF-1894-BD8C-0A3FF41B60EA}"/>
               </a:ext>
             </a:extLst>
@@ -8289,10 +8376,9 @@
           <a:lstStyle/>
           <a:p>
             <a:r>
-              <a:rPr lang="en-US" dirty="0" err="1"/>
-              <a:t>Refernces</a:t>
-            </a:r>
-            <a:endParaRPr lang="en-US" dirty="0"/>
+              <a:rPr lang="en-US" dirty="0"/>
+              <a:t>References</a:t>
+            </a:r>
           </a:p>
         </p:txBody>
       </p:sp>
@@ -8391,32 +8477,16 @@
             </a:r>
             <a:r>
               <a:rPr lang="en-US" dirty="0"/>
-              <a:t>, Multiclass classification of dry beans using computer vision and machine learning techniques, Computers and Electronics in </a:t>
-            </a:r>
-            <a:r>
-              <a:rPr lang="en-US"/>
-              <a:t>Agriculture, Volume 174, 2020, 105507, ISSN 0168-1699, </a:t>
-            </a:r>
-            <a:r>
-              <a:rPr lang="en-US">
-                <a:hlinkClick r:id="rId5"/>
-              </a:rPr>
-              <a:t>https</a:t>
+              <a:t>, Multiclass classification of dry beans using computer vision and machine learning techniques, Computers and Electronics in Agriculture, Volume 174, 2020, 105507, ISSN 0168-1699, </a:t>
             </a:r>
             <a:r>
               <a:rPr lang="en-US" dirty="0">
                 <a:hlinkClick r:id="rId5"/>
               </a:rPr>
-              <a:t>://doi.org/10.1016/j.compag.</a:t>
-            </a:r>
-            <a:r>
-              <a:rPr lang="en-US">
-                <a:hlinkClick r:id="rId5"/>
-              </a:rPr>
-              <a:t>2020.105507</a:t>
-            </a:r>
-            <a:r>
-              <a:rPr lang="en-US"/>
+              <a:t>https://doi.org/10.1016/j.compag.2020.105507</a:t>
+            </a:r>
+            <a:r>
+              <a:rPr lang="en-US" dirty="0"/>
               <a:t>.</a:t>
             </a:r>
           </a:p>
@@ -8716,6 +8786,675 @@
           <p:cNvPr id="2" name="Title 1">
             <a:extLst>
               <a:ext uri="{FF2B5EF4-FFF2-40B4-BE49-F238E27FC236}">
+                <a16:creationId xmlns:a16="http://schemas.microsoft.com/office/drawing/2014/main" id="{043949A3-2226-930B-AFBF-D88DF7FA306D}"/>
+              </a:ext>
+            </a:extLst>
+          </p:cNvPr>
+          <p:cNvSpPr>
+            <a:spLocks noGrp="1"/>
+          </p:cNvSpPr>
+          <p:nvPr>
+            <p:ph type="title"/>
+          </p:nvPr>
+        </p:nvSpPr>
+        <p:spPr>
+          <a:xfrm>
+            <a:off x="2592925" y="274488"/>
+            <a:ext cx="8911687" cy="989536"/>
+          </a:xfrm>
+        </p:spPr>
+        <p:txBody>
+          <a:bodyPr/>
+          <a:lstStyle/>
+          <a:p>
+            <a:r>
+              <a:rPr lang="en-US" dirty="0"/>
+              <a:t>Feature Table</a:t>
+            </a:r>
+            <a:br>
+              <a:rPr lang="en-US" dirty="0"/>
+            </a:br>
+            <a:r>
+              <a:rPr lang="en-US" sz="1800" dirty="0"/>
+              <a:t>From the dataset metadata</a:t>
+            </a:r>
+          </a:p>
+        </p:txBody>
+      </p:sp>
+      <p:graphicFrame>
+        <p:nvGraphicFramePr>
+          <p:cNvPr id="4" name="Content Placeholder 3">
+            <a:extLst>
+              <a:ext uri="{FF2B5EF4-FFF2-40B4-BE49-F238E27FC236}">
+                <a16:creationId xmlns:a16="http://schemas.microsoft.com/office/drawing/2014/main" id="{E055F4CA-A8A5-174E-9821-C97DBDDFF023}"/>
+              </a:ext>
+            </a:extLst>
+          </p:cNvPr>
+          <p:cNvGraphicFramePr>
+            <a:graphicFrameLocks noGrp="1"/>
+          </p:cNvGraphicFramePr>
+          <p:nvPr>
+            <p:ph idx="1"/>
+            <p:extLst>
+              <p:ext uri="{D42A27DB-BD31-4B8C-83A1-F6EECF244321}">
+                <p14:modId xmlns:p14="http://schemas.microsoft.com/office/powerpoint/2010/main" val="2902838540"/>
+              </p:ext>
+            </p:extLst>
+          </p:nvPr>
+        </p:nvGraphicFramePr>
+        <p:xfrm>
+          <a:off x="2592925" y="1299884"/>
+          <a:ext cx="9324881" cy="5257800"/>
+        </p:xfrm>
+        <a:graphic>
+          <a:graphicData uri="http://schemas.openxmlformats.org/drawingml/2006/table">
+            <a:tbl>
+              <a:tblPr firstRow="1" bandRow="1">
+                <a:tableStyleId>{5C22544A-7EE6-4342-B048-85BDC9FD1C3A}</a:tableStyleId>
+              </a:tblPr>
+              <a:tblGrid>
+                <a:gridCol w="2172308">
+                  <a:extLst>
+                    <a:ext uri="{9D8B030D-6E8A-4147-A177-3AD203B41FA5}">
+                      <a16:colId xmlns:a16="http://schemas.microsoft.com/office/drawing/2014/main" val="3606180382"/>
+                    </a:ext>
+                  </a:extLst>
+                </a:gridCol>
+                <a:gridCol w="1518986">
+                  <a:extLst>
+                    <a:ext uri="{9D8B030D-6E8A-4147-A177-3AD203B41FA5}">
+                      <a16:colId xmlns:a16="http://schemas.microsoft.com/office/drawing/2014/main" val="2858770988"/>
+                    </a:ext>
+                  </a:extLst>
+                </a:gridCol>
+                <a:gridCol w="5633587">
+                  <a:extLst>
+                    <a:ext uri="{9D8B030D-6E8A-4147-A177-3AD203B41FA5}">
+                      <a16:colId xmlns:a16="http://schemas.microsoft.com/office/drawing/2014/main" val="3410820213"/>
+                    </a:ext>
+                  </a:extLst>
+                </a:gridCol>
+              </a:tblGrid>
+              <a:tr h="370840">
+                <a:tc>
+                  <a:txBody>
+                    <a:bodyPr/>
+                    <a:lstStyle/>
+                    <a:p>
+                      <a:r>
+                        <a:rPr lang="en-US" sz="1400" dirty="0"/>
+                        <a:t>Feature</a:t>
+                      </a:r>
+                    </a:p>
+                  </a:txBody>
+                  <a:tcPr/>
+                </a:tc>
+                <a:tc>
+                  <a:txBody>
+                    <a:bodyPr/>
+                    <a:lstStyle/>
+                    <a:p>
+                      <a:r>
+                        <a:rPr lang="en-US" sz="1400" dirty="0"/>
+                        <a:t>Type</a:t>
+                      </a:r>
+                    </a:p>
+                  </a:txBody>
+                  <a:tcPr/>
+                </a:tc>
+                <a:tc>
+                  <a:txBody>
+                    <a:bodyPr/>
+                    <a:lstStyle/>
+                    <a:p>
+                      <a:r>
+                        <a:rPr lang="en-US" sz="1400" dirty="0"/>
+                        <a:t>Description</a:t>
+                      </a:r>
+                    </a:p>
+                  </a:txBody>
+                  <a:tcPr/>
+                </a:tc>
+                <a:extLst>
+                  <a:ext uri="{0D108BD9-81ED-4DB2-BD59-A6C34878D82A}">
+                    <a16:rowId xmlns:a16="http://schemas.microsoft.com/office/drawing/2014/main" val="3643849486"/>
+                  </a:ext>
+                </a:extLst>
+              </a:tr>
+              <a:tr h="370840">
+                <a:tc>
+                  <a:txBody>
+                    <a:bodyPr/>
+                    <a:lstStyle/>
+                    <a:p>
+                      <a:r>
+                        <a:rPr lang="en-US" sz="1400" dirty="0"/>
+                        <a:t>Area</a:t>
+                      </a:r>
+                    </a:p>
+                  </a:txBody>
+                  <a:tcPr/>
+                </a:tc>
+                <a:tc>
+                  <a:txBody>
+                    <a:bodyPr/>
+                    <a:lstStyle/>
+                    <a:p>
+                      <a:r>
+                        <a:rPr lang="en-US" sz="1400" dirty="0"/>
+                        <a:t>Integer</a:t>
+                      </a:r>
+                    </a:p>
+                  </a:txBody>
+                  <a:tcPr/>
+                </a:tc>
+                <a:tc>
+                  <a:txBody>
+                    <a:bodyPr/>
+                    <a:lstStyle/>
+                    <a:p>
+                      <a:r>
+                        <a:rPr lang="en-US" sz="1400" dirty="0"/>
+                        <a:t>The area of a bean zone and the number of pixels within its boundaries</a:t>
+                      </a:r>
+                    </a:p>
+                  </a:txBody>
+                  <a:tcPr/>
+                </a:tc>
+                <a:extLst>
+                  <a:ext uri="{0D108BD9-81ED-4DB2-BD59-A6C34878D82A}">
+                    <a16:rowId xmlns:a16="http://schemas.microsoft.com/office/drawing/2014/main" val="2057167726"/>
+                  </a:ext>
+                </a:extLst>
+              </a:tr>
+              <a:tr h="370840">
+                <a:tc>
+                  <a:txBody>
+                    <a:bodyPr/>
+                    <a:lstStyle/>
+                    <a:p>
+                      <a:r>
+                        <a:rPr lang="en-US" sz="1400" dirty="0"/>
+                        <a:t>Perimeter</a:t>
+                      </a:r>
+                    </a:p>
+                  </a:txBody>
+                  <a:tcPr/>
+                </a:tc>
+                <a:tc>
+                  <a:txBody>
+                    <a:bodyPr/>
+                    <a:lstStyle/>
+                    <a:p>
+                      <a:r>
+                        <a:rPr lang="en-US" sz="1400" dirty="0"/>
+                        <a:t>Continuous</a:t>
+                      </a:r>
+                    </a:p>
+                  </a:txBody>
+                  <a:tcPr/>
+                </a:tc>
+                <a:tc>
+                  <a:txBody>
+                    <a:bodyPr/>
+                    <a:lstStyle/>
+                    <a:p>
+                      <a:r>
+                        <a:rPr lang="en-US" sz="1400" dirty="0"/>
+                        <a:t>Bean circumference is defined as the length of its border.</a:t>
+                      </a:r>
+                    </a:p>
+                  </a:txBody>
+                  <a:tcPr/>
+                </a:tc>
+                <a:extLst>
+                  <a:ext uri="{0D108BD9-81ED-4DB2-BD59-A6C34878D82A}">
+                    <a16:rowId xmlns:a16="http://schemas.microsoft.com/office/drawing/2014/main" val="1922486269"/>
+                  </a:ext>
+                </a:extLst>
+              </a:tr>
+              <a:tr h="370840">
+                <a:tc>
+                  <a:txBody>
+                    <a:bodyPr/>
+                    <a:lstStyle/>
+                    <a:p>
+                      <a:r>
+                        <a:rPr lang="en-US" sz="1400" dirty="0" err="1"/>
+                        <a:t>MajorAxisLength</a:t>
+                      </a:r>
+                      <a:endParaRPr lang="en-US" sz="1400" dirty="0"/>
+                    </a:p>
+                  </a:txBody>
+                  <a:tcPr/>
+                </a:tc>
+                <a:tc>
+                  <a:txBody>
+                    <a:bodyPr/>
+                    <a:lstStyle/>
+                    <a:p>
+                      <a:r>
+                        <a:rPr lang="en-US" sz="1400" dirty="0"/>
+                        <a:t>Continuous</a:t>
+                      </a:r>
+                    </a:p>
+                  </a:txBody>
+                  <a:tcPr/>
+                </a:tc>
+                <a:tc>
+                  <a:txBody>
+                    <a:bodyPr/>
+                    <a:lstStyle/>
+                    <a:p>
+                      <a:r>
+                        <a:rPr lang="en-US" sz="1400" dirty="0"/>
+                        <a:t>The distance between the ends of the longest line that can be drawn from a bean</a:t>
+                      </a:r>
+                    </a:p>
+                  </a:txBody>
+                  <a:tcPr/>
+                </a:tc>
+                <a:extLst>
+                  <a:ext uri="{0D108BD9-81ED-4DB2-BD59-A6C34878D82A}">
+                    <a16:rowId xmlns:a16="http://schemas.microsoft.com/office/drawing/2014/main" val="461359688"/>
+                  </a:ext>
+                </a:extLst>
+              </a:tr>
+              <a:tr h="370840">
+                <a:tc>
+                  <a:txBody>
+                    <a:bodyPr/>
+                    <a:lstStyle/>
+                    <a:p>
+                      <a:r>
+                        <a:rPr lang="en-US" sz="1400" dirty="0" err="1"/>
+                        <a:t>MinorAxisLength</a:t>
+                      </a:r>
+                      <a:endParaRPr lang="en-US" sz="1400" dirty="0"/>
+                    </a:p>
+                  </a:txBody>
+                  <a:tcPr/>
+                </a:tc>
+                <a:tc>
+                  <a:txBody>
+                    <a:bodyPr/>
+                    <a:lstStyle/>
+                    <a:p>
+                      <a:r>
+                        <a:rPr lang="en-US" sz="1400" dirty="0"/>
+                        <a:t>Continuous</a:t>
+                      </a:r>
+                    </a:p>
+                  </a:txBody>
+                  <a:tcPr/>
+                </a:tc>
+                <a:tc>
+                  <a:txBody>
+                    <a:bodyPr/>
+                    <a:lstStyle/>
+                    <a:p>
+                      <a:pPr marL="0" marR="0" lvl="0" indent="0" algn="l" defTabSz="457200" rtl="0" eaLnBrk="1" fontAlgn="auto" latinLnBrk="0" hangingPunct="1">
+                        <a:lnSpc>
+                          <a:spcPct val="100000"/>
+                        </a:lnSpc>
+                        <a:spcBef>
+                          <a:spcPts val="0"/>
+                        </a:spcBef>
+                        <a:spcAft>
+                          <a:spcPts val="0"/>
+                        </a:spcAft>
+                        <a:buClrTx/>
+                        <a:buSzTx/>
+                        <a:buFontTx/>
+                        <a:buNone/>
+                        <a:tabLst/>
+                        <a:defRPr/>
+                      </a:pPr>
+                      <a:r>
+                        <a:rPr lang="en-US" sz="1400" dirty="0"/>
+                        <a:t>The longest line that can be drawn from the bean while standing perpendicular to the main axis</a:t>
+                      </a:r>
+                    </a:p>
+                  </a:txBody>
+                  <a:tcPr/>
+                </a:tc>
+                <a:extLst>
+                  <a:ext uri="{0D108BD9-81ED-4DB2-BD59-A6C34878D82A}">
+                    <a16:rowId xmlns:a16="http://schemas.microsoft.com/office/drawing/2014/main" val="406362073"/>
+                  </a:ext>
+                </a:extLst>
+              </a:tr>
+              <a:tr h="370840">
+                <a:tc>
+                  <a:txBody>
+                    <a:bodyPr/>
+                    <a:lstStyle/>
+                    <a:p>
+                      <a:r>
+                        <a:rPr lang="en-US" sz="1400" dirty="0" err="1"/>
+                        <a:t>AspectRatio</a:t>
+                      </a:r>
+                      <a:endParaRPr lang="en-US" sz="1400" dirty="0"/>
+                    </a:p>
+                  </a:txBody>
+                  <a:tcPr/>
+                </a:tc>
+                <a:tc>
+                  <a:txBody>
+                    <a:bodyPr/>
+                    <a:lstStyle/>
+                    <a:p>
+                      <a:r>
+                        <a:rPr lang="en-US" sz="1400" dirty="0"/>
+                        <a:t>Continuous</a:t>
+                      </a:r>
+                    </a:p>
+                  </a:txBody>
+                  <a:tcPr/>
+                </a:tc>
+                <a:tc>
+                  <a:txBody>
+                    <a:bodyPr/>
+                    <a:lstStyle/>
+                    <a:p>
+                      <a:r>
+                        <a:rPr lang="en-US" sz="1400" dirty="0"/>
+                        <a:t>Defines the relationship between </a:t>
+                      </a:r>
+                      <a:r>
+                        <a:rPr lang="en-US" sz="1400" dirty="0" err="1"/>
+                        <a:t>MajorAxisLength</a:t>
+                      </a:r>
+                      <a:r>
+                        <a:rPr lang="en-US" sz="1400" dirty="0"/>
+                        <a:t> and </a:t>
+                      </a:r>
+                      <a:r>
+                        <a:rPr lang="en-US" sz="1400" dirty="0" err="1"/>
+                        <a:t>MinorAxisLength</a:t>
+                      </a:r>
+                      <a:endParaRPr lang="en-US" sz="1400" dirty="0"/>
+                    </a:p>
+                  </a:txBody>
+                  <a:tcPr/>
+                </a:tc>
+                <a:extLst>
+                  <a:ext uri="{0D108BD9-81ED-4DB2-BD59-A6C34878D82A}">
+                    <a16:rowId xmlns:a16="http://schemas.microsoft.com/office/drawing/2014/main" val="2904731263"/>
+                  </a:ext>
+                </a:extLst>
+              </a:tr>
+              <a:tr h="370840">
+                <a:tc>
+                  <a:txBody>
+                    <a:bodyPr/>
+                    <a:lstStyle/>
+                    <a:p>
+                      <a:r>
+                        <a:rPr lang="en-US" sz="1400" dirty="0"/>
+                        <a:t>Eccentricity</a:t>
+                      </a:r>
+                    </a:p>
+                  </a:txBody>
+                  <a:tcPr/>
+                </a:tc>
+                <a:tc>
+                  <a:txBody>
+                    <a:bodyPr/>
+                    <a:lstStyle/>
+                    <a:p>
+                      <a:r>
+                        <a:rPr lang="en-US" sz="1400" dirty="0"/>
+                        <a:t>Continuous</a:t>
+                      </a:r>
+                    </a:p>
+                  </a:txBody>
+                  <a:tcPr/>
+                </a:tc>
+                <a:tc>
+                  <a:txBody>
+                    <a:bodyPr/>
+                    <a:lstStyle/>
+                    <a:p>
+                      <a:r>
+                        <a:rPr lang="en-US" sz="1400" dirty="0"/>
+                        <a:t>Eccentricity of the ellipse having the same moments as the region</a:t>
+                      </a:r>
+                    </a:p>
+                  </a:txBody>
+                  <a:tcPr/>
+                </a:tc>
+                <a:extLst>
+                  <a:ext uri="{0D108BD9-81ED-4DB2-BD59-A6C34878D82A}">
+                    <a16:rowId xmlns:a16="http://schemas.microsoft.com/office/drawing/2014/main" val="3512557299"/>
+                  </a:ext>
+                </a:extLst>
+              </a:tr>
+              <a:tr h="370840">
+                <a:tc>
+                  <a:txBody>
+                    <a:bodyPr/>
+                    <a:lstStyle/>
+                    <a:p>
+                      <a:r>
+                        <a:rPr lang="en-US" sz="1400" dirty="0" err="1"/>
+                        <a:t>ConvexArea</a:t>
+                      </a:r>
+                      <a:endParaRPr lang="en-US" sz="1400" dirty="0"/>
+                    </a:p>
+                  </a:txBody>
+                  <a:tcPr/>
+                </a:tc>
+                <a:tc>
+                  <a:txBody>
+                    <a:bodyPr/>
+                    <a:lstStyle/>
+                    <a:p>
+                      <a:r>
+                        <a:rPr lang="en-US" sz="1400" dirty="0"/>
+                        <a:t>Integer</a:t>
+                      </a:r>
+                    </a:p>
+                  </a:txBody>
+                  <a:tcPr/>
+                </a:tc>
+                <a:tc>
+                  <a:txBody>
+                    <a:bodyPr/>
+                    <a:lstStyle/>
+                    <a:p>
+                      <a:r>
+                        <a:rPr lang="en-US" sz="1400" dirty="0"/>
+                        <a:t>Number of pixels in the smallest convex polygon that can contain the area of a bean seed</a:t>
+                      </a:r>
+                    </a:p>
+                  </a:txBody>
+                  <a:tcPr/>
+                </a:tc>
+                <a:extLst>
+                  <a:ext uri="{0D108BD9-81ED-4DB2-BD59-A6C34878D82A}">
+                    <a16:rowId xmlns:a16="http://schemas.microsoft.com/office/drawing/2014/main" val="879411917"/>
+                  </a:ext>
+                </a:extLst>
+              </a:tr>
+              <a:tr h="370840">
+                <a:tc>
+                  <a:txBody>
+                    <a:bodyPr/>
+                    <a:lstStyle/>
+                    <a:p>
+                      <a:r>
+                        <a:rPr lang="en-US" sz="1400" dirty="0" err="1"/>
+                        <a:t>EquivDiameter</a:t>
+                      </a:r>
+                      <a:endParaRPr lang="en-US" sz="1400" dirty="0"/>
+                    </a:p>
+                  </a:txBody>
+                  <a:tcPr/>
+                </a:tc>
+                <a:tc>
+                  <a:txBody>
+                    <a:bodyPr/>
+                    <a:lstStyle/>
+                    <a:p>
+                      <a:r>
+                        <a:rPr lang="en-US" sz="1400" dirty="0"/>
+                        <a:t>Continuous</a:t>
+                      </a:r>
+                    </a:p>
+                  </a:txBody>
+                  <a:tcPr/>
+                </a:tc>
+                <a:tc>
+                  <a:txBody>
+                    <a:bodyPr/>
+                    <a:lstStyle/>
+                    <a:p>
+                      <a:r>
+                        <a:rPr lang="en-US" sz="1400" dirty="0"/>
+                        <a:t>Equivalent diameter: The diameter of a circle having the same area as a bean seed area</a:t>
+                      </a:r>
+                    </a:p>
+                  </a:txBody>
+                  <a:tcPr/>
+                </a:tc>
+                <a:extLst>
+                  <a:ext uri="{0D108BD9-81ED-4DB2-BD59-A6C34878D82A}">
+                    <a16:rowId xmlns:a16="http://schemas.microsoft.com/office/drawing/2014/main" val="3358025857"/>
+                  </a:ext>
+                </a:extLst>
+              </a:tr>
+              <a:tr h="370840">
+                <a:tc>
+                  <a:txBody>
+                    <a:bodyPr/>
+                    <a:lstStyle/>
+                    <a:p>
+                      <a:r>
+                        <a:rPr lang="en-US" sz="1400" dirty="0"/>
+                        <a:t>Extent</a:t>
+                      </a:r>
+                    </a:p>
+                  </a:txBody>
+                  <a:tcPr/>
+                </a:tc>
+                <a:tc>
+                  <a:txBody>
+                    <a:bodyPr/>
+                    <a:lstStyle/>
+                    <a:p>
+                      <a:r>
+                        <a:rPr lang="en-US" sz="1400" dirty="0"/>
+                        <a:t>Continuous</a:t>
+                      </a:r>
+                    </a:p>
+                  </a:txBody>
+                  <a:tcPr/>
+                </a:tc>
+                <a:tc>
+                  <a:txBody>
+                    <a:bodyPr/>
+                    <a:lstStyle/>
+                    <a:p>
+                      <a:r>
+                        <a:rPr lang="en-US" sz="1400" dirty="0"/>
+                        <a:t>The ratio of the pixels in the bounding box to the bean area</a:t>
+                      </a:r>
+                    </a:p>
+                  </a:txBody>
+                  <a:tcPr/>
+                </a:tc>
+                <a:extLst>
+                  <a:ext uri="{0D108BD9-81ED-4DB2-BD59-A6C34878D82A}">
+                    <a16:rowId xmlns:a16="http://schemas.microsoft.com/office/drawing/2014/main" val="2914461509"/>
+                  </a:ext>
+                </a:extLst>
+              </a:tr>
+              <a:tr h="370840">
+                <a:tc>
+                  <a:txBody>
+                    <a:bodyPr/>
+                    <a:lstStyle/>
+                    <a:p>
+                      <a:r>
+                        <a:rPr lang="en-US" sz="1400" dirty="0"/>
+                        <a:t>Solidity</a:t>
+                      </a:r>
+                    </a:p>
+                  </a:txBody>
+                  <a:tcPr/>
+                </a:tc>
+                <a:tc>
+                  <a:txBody>
+                    <a:bodyPr/>
+                    <a:lstStyle/>
+                    <a:p>
+                      <a:r>
+                        <a:rPr lang="en-US" sz="1400" dirty="0"/>
+                        <a:t>Continuous</a:t>
+                      </a:r>
+                    </a:p>
+                  </a:txBody>
+                  <a:tcPr/>
+                </a:tc>
+                <a:tc>
+                  <a:txBody>
+                    <a:bodyPr/>
+                    <a:lstStyle/>
+                    <a:p>
+                      <a:r>
+                        <a:rPr lang="en-US" sz="1400" dirty="0"/>
+                        <a:t>Also known as convexity. The ratio of the pixels in the convex shell to those found in beans.</a:t>
+                      </a:r>
+                    </a:p>
+                  </a:txBody>
+                  <a:tcPr/>
+                </a:tc>
+                <a:extLst>
+                  <a:ext uri="{0D108BD9-81ED-4DB2-BD59-A6C34878D82A}">
+                    <a16:rowId xmlns:a16="http://schemas.microsoft.com/office/drawing/2014/main" val="1666580354"/>
+                  </a:ext>
+                </a:extLst>
+              </a:tr>
+            </a:tbl>
+          </a:graphicData>
+        </a:graphic>
+      </p:graphicFrame>
+    </p:spTree>
+    <p:extLst>
+      <p:ext uri="{BB962C8B-B14F-4D97-AF65-F5344CB8AC3E}">
+        <p14:creationId xmlns:p14="http://schemas.microsoft.com/office/powerpoint/2010/main" val="397896211"/>
+      </p:ext>
+    </p:extLst>
+  </p:cSld>
+  <p:clrMapOvr>
+    <a:masterClrMapping/>
+  </p:clrMapOvr>
+</p:sld>
+</file>
+
+<file path=ppt/slides/slide5.xml><?xml version="1.0" encoding="utf-8"?>
+<p:sld xmlns:a="http://schemas.openxmlformats.org/drawingml/2006/main" xmlns:r="http://schemas.openxmlformats.org/officeDocument/2006/relationships" xmlns:p="http://schemas.openxmlformats.org/presentationml/2006/main">
+  <p:cSld>
+    <p:spTree>
+      <p:nvGrpSpPr>
+        <p:cNvPr id="1" name=""/>
+        <p:cNvGrpSpPr/>
+        <p:nvPr/>
+      </p:nvGrpSpPr>
+      <p:grpSpPr>
+        <a:xfrm>
+          <a:off x="0" y="0"/>
+          <a:ext cx="0" cy="0"/>
+          <a:chOff x="0" y="0"/>
+          <a:chExt cx="0" cy="0"/>
+        </a:xfrm>
+      </p:grpSpPr>
+      <p:sp>
+        <p:nvSpPr>
+          <p:cNvPr id="2" name="Title 1">
+            <a:extLst>
+              <a:ext uri="{FF2B5EF4-FFF2-40B4-BE49-F238E27FC236}">
                 <a16:creationId xmlns:a16="http://schemas.microsoft.com/office/drawing/2014/main" id="{D59E8225-5AFD-5675-19FE-999B4DEAC664}"/>
               </a:ext>
             </a:extLst>
@@ -8777,7 +9516,7 @@
 </p:sld>
 </file>
 
-<file path=ppt/slides/slide5.xml><?xml version="1.0" encoding="utf-8"?>
+<file path=ppt/slides/slide6.xml><?xml version="1.0" encoding="utf-8"?>
 <p:sld xmlns:a="http://schemas.openxmlformats.org/drawingml/2006/main" xmlns:r="http://schemas.openxmlformats.org/officeDocument/2006/relationships" xmlns:p="http://schemas.openxmlformats.org/presentationml/2006/main">
   <p:cSld>
     <p:spTree>
@@ -8867,7 +9606,7 @@
 </p:sld>
 </file>
 
-<file path=ppt/slides/slide6.xml><?xml version="1.0" encoding="utf-8"?>
+<file path=ppt/slides/slide7.xml><?xml version="1.0" encoding="utf-8"?>
 <p:sld xmlns:a="http://schemas.openxmlformats.org/drawingml/2006/main" xmlns:r="http://schemas.openxmlformats.org/officeDocument/2006/relationships" xmlns:p="http://schemas.openxmlformats.org/presentationml/2006/main">
   <p:cSld>
     <p:spTree>
@@ -8957,7 +9696,7 @@
 </p:sld>
 </file>
 
-<file path=ppt/slides/slide7.xml><?xml version="1.0" encoding="utf-8"?>
+<file path=ppt/slides/slide8.xml><?xml version="1.0" encoding="utf-8"?>
 <p:sld xmlns:a="http://schemas.openxmlformats.org/drawingml/2006/main" xmlns:r="http://schemas.openxmlformats.org/officeDocument/2006/relationships" xmlns:p="http://schemas.openxmlformats.org/presentationml/2006/main">
   <p:cSld>
     <p:spTree>
@@ -9043,7 +9782,7 @@
 </p:sld>
 </file>
 
-<file path=ppt/slides/slide8.xml><?xml version="1.0" encoding="utf-8"?>
+<file path=ppt/slides/slide9.xml><?xml version="1.0" encoding="utf-8"?>
 <p:sld xmlns:a="http://schemas.openxmlformats.org/drawingml/2006/main" xmlns:r="http://schemas.openxmlformats.org/officeDocument/2006/relationships" xmlns:p="http://schemas.openxmlformats.org/presentationml/2006/main">
   <p:cSld>
     <p:spTree>
@@ -9128,92 +9867,6 @@
     <p:extLst>
       <p:ext uri="{BB962C8B-B14F-4D97-AF65-F5344CB8AC3E}">
         <p14:creationId xmlns:p14="http://schemas.microsoft.com/office/powerpoint/2010/main" val="528545580"/>
-      </p:ext>
-    </p:extLst>
-  </p:cSld>
-  <p:clrMapOvr>
-    <a:masterClrMapping/>
-  </p:clrMapOvr>
-</p:sld>
-</file>
-
-<file path=ppt/slides/slide9.xml><?xml version="1.0" encoding="utf-8"?>
-<p:sld xmlns:a="http://schemas.openxmlformats.org/drawingml/2006/main" xmlns:r="http://schemas.openxmlformats.org/officeDocument/2006/relationships" xmlns:p="http://schemas.openxmlformats.org/presentationml/2006/main">
-  <p:cSld>
-    <p:spTree>
-      <p:nvGrpSpPr>
-        <p:cNvPr id="1" name=""/>
-        <p:cNvGrpSpPr/>
-        <p:nvPr/>
-      </p:nvGrpSpPr>
-      <p:grpSpPr>
-        <a:xfrm>
-          <a:off x="0" y="0"/>
-          <a:ext cx="0" cy="0"/>
-          <a:chOff x="0" y="0"/>
-          <a:chExt cx="0" cy="0"/>
-        </a:xfrm>
-      </p:grpSpPr>
-      <p:sp>
-        <p:nvSpPr>
-          <p:cNvPr id="2" name="Title 1">
-            <a:extLst>
-              <a:ext uri="{FF2B5EF4-FFF2-40B4-BE49-F238E27FC236}">
-                <a16:creationId xmlns:a16="http://schemas.microsoft.com/office/drawing/2014/main" id="{3310FC7E-C825-F0BD-A1DD-385964BABEAB}"/>
-              </a:ext>
-            </a:extLst>
-          </p:cNvPr>
-          <p:cNvSpPr>
-            <a:spLocks noGrp="1"/>
-          </p:cNvSpPr>
-          <p:nvPr>
-            <p:ph type="title"/>
-          </p:nvPr>
-        </p:nvSpPr>
-        <p:spPr/>
-        <p:txBody>
-          <a:bodyPr/>
-          <a:lstStyle/>
-          <a:p>
-            <a:r>
-              <a:rPr lang="en-US" dirty="0"/>
-              <a:t>Building a model 2</a:t>
-            </a:r>
-          </a:p>
-        </p:txBody>
-      </p:sp>
-      <p:sp>
-        <p:nvSpPr>
-          <p:cNvPr id="3" name="Text Placeholder 2">
-            <a:extLst>
-              <a:ext uri="{FF2B5EF4-FFF2-40B4-BE49-F238E27FC236}">
-                <a16:creationId xmlns:a16="http://schemas.microsoft.com/office/drawing/2014/main" id="{1074075D-CE01-638E-DE5A-4C66625E0881}"/>
-              </a:ext>
-            </a:extLst>
-          </p:cNvPr>
-          <p:cNvSpPr>
-            <a:spLocks noGrp="1"/>
-          </p:cNvSpPr>
-          <p:nvPr>
-            <p:ph type="body" idx="1"/>
-          </p:nvPr>
-        </p:nvSpPr>
-        <p:spPr/>
-        <p:txBody>
-          <a:bodyPr/>
-          <a:lstStyle/>
-          <a:p>
-            <a:r>
-              <a:rPr lang="en-US" dirty="0"/>
-              <a:t>Random Forest</a:t>
-            </a:r>
-          </a:p>
-        </p:txBody>
-      </p:sp>
-    </p:spTree>
-    <p:extLst>
-      <p:ext uri="{BB962C8B-B14F-4D97-AF65-F5344CB8AC3E}">
-        <p14:creationId xmlns:p14="http://schemas.microsoft.com/office/powerpoint/2010/main" val="3275172996"/>
       </p:ext>
     </p:extLst>
   </p:cSld>

</xml_diff>